<commit_message>
Update 42 & 43.
</commit_message>
<xml_diff>
--- a/41傳揚福音.pptx
+++ b/41傳揚福音.pptx
@@ -312,7 +312,7 @@
             <a:fld id="{86B5546F-C09B-4E63-ABC5-F7C86A7E8D66}" type="datetimeFigureOut">
               <a:rPr lang="en-US" smtClean="0"/>
               <a:pPr/>
-              <a:t>5/9/2020</a:t>
+              <a:t>1/1/2022</a:t>
             </a:fld>
             <a:endParaRPr lang="en-US"/>
           </a:p>
@@ -484,7 +484,7 @@
             <a:fld id="{86B5546F-C09B-4E63-ABC5-F7C86A7E8D66}" type="datetimeFigureOut">
               <a:rPr lang="en-US" smtClean="0"/>
               <a:pPr/>
-              <a:t>5/9/2020</a:t>
+              <a:t>1/1/2022</a:t>
             </a:fld>
             <a:endParaRPr lang="en-US"/>
           </a:p>
@@ -666,7 +666,7 @@
             <a:fld id="{86B5546F-C09B-4E63-ABC5-F7C86A7E8D66}" type="datetimeFigureOut">
               <a:rPr lang="en-US" smtClean="0"/>
               <a:pPr/>
-              <a:t>5/9/2020</a:t>
+              <a:t>1/1/2022</a:t>
             </a:fld>
             <a:endParaRPr lang="en-US"/>
           </a:p>
@@ -838,7 +838,7 @@
             <a:fld id="{86B5546F-C09B-4E63-ABC5-F7C86A7E8D66}" type="datetimeFigureOut">
               <a:rPr lang="en-US" smtClean="0"/>
               <a:pPr/>
-              <a:t>5/9/2020</a:t>
+              <a:t>1/1/2022</a:t>
             </a:fld>
             <a:endParaRPr lang="en-US"/>
           </a:p>
@@ -1086,7 +1086,7 @@
             <a:fld id="{86B5546F-C09B-4E63-ABC5-F7C86A7E8D66}" type="datetimeFigureOut">
               <a:rPr lang="en-US" smtClean="0"/>
               <a:pPr/>
-              <a:t>5/9/2020</a:t>
+              <a:t>1/1/2022</a:t>
             </a:fld>
             <a:endParaRPr lang="en-US"/>
           </a:p>
@@ -1376,7 +1376,7 @@
             <a:fld id="{86B5546F-C09B-4E63-ABC5-F7C86A7E8D66}" type="datetimeFigureOut">
               <a:rPr lang="en-US" smtClean="0"/>
               <a:pPr/>
-              <a:t>5/9/2020</a:t>
+              <a:t>1/1/2022</a:t>
             </a:fld>
             <a:endParaRPr lang="en-US"/>
           </a:p>
@@ -1800,7 +1800,7 @@
             <a:fld id="{86B5546F-C09B-4E63-ABC5-F7C86A7E8D66}" type="datetimeFigureOut">
               <a:rPr lang="en-US" smtClean="0"/>
               <a:pPr/>
-              <a:t>5/9/2020</a:t>
+              <a:t>1/1/2022</a:t>
             </a:fld>
             <a:endParaRPr lang="en-US"/>
           </a:p>
@@ -1920,7 +1920,7 @@
             <a:fld id="{86B5546F-C09B-4E63-ABC5-F7C86A7E8D66}" type="datetimeFigureOut">
               <a:rPr lang="en-US" smtClean="0"/>
               <a:pPr/>
-              <a:t>5/9/2020</a:t>
+              <a:t>1/1/2022</a:t>
             </a:fld>
             <a:endParaRPr lang="en-US"/>
           </a:p>
@@ -2017,7 +2017,7 @@
             <a:fld id="{86B5546F-C09B-4E63-ABC5-F7C86A7E8D66}" type="datetimeFigureOut">
               <a:rPr lang="en-US" smtClean="0"/>
               <a:pPr/>
-              <a:t>5/9/2020</a:t>
+              <a:t>1/1/2022</a:t>
             </a:fld>
             <a:endParaRPr lang="en-US"/>
           </a:p>
@@ -2296,7 +2296,7 @@
             <a:fld id="{86B5546F-C09B-4E63-ABC5-F7C86A7E8D66}" type="datetimeFigureOut">
               <a:rPr lang="en-US" smtClean="0"/>
               <a:pPr/>
-              <a:t>5/9/2020</a:t>
+              <a:t>1/1/2022</a:t>
             </a:fld>
             <a:endParaRPr lang="en-US"/>
           </a:p>
@@ -2555,7 +2555,7 @@
             <a:fld id="{86B5546F-C09B-4E63-ABC5-F7C86A7E8D66}" type="datetimeFigureOut">
               <a:rPr lang="en-US" smtClean="0"/>
               <a:pPr/>
-              <a:t>5/9/2020</a:t>
+              <a:t>1/1/2022</a:t>
             </a:fld>
             <a:endParaRPr lang="en-US"/>
           </a:p>
@@ -2775,7 +2775,7 @@
             <a:fld id="{86B5546F-C09B-4E63-ABC5-F7C86A7E8D66}" type="datetimeFigureOut">
               <a:rPr lang="en-US" smtClean="0"/>
               <a:pPr/>
-              <a:t>5/9/2020</a:t>
+              <a:t>1/1/2022</a:t>
             </a:fld>
             <a:endParaRPr lang="en-US"/>
           </a:p>
@@ -3227,7 +3227,7 @@
             <a:r>
               <a:rPr lang="zh-CN" altLang="en-US" b="1" dirty="0">
                 <a:solidFill>
-                  <a:srgbClr val="002060"/>
+                  <a:srgbClr val="000066"/>
                 </a:solidFill>
                 <a:latin typeface="微軟正黑體" pitchFamily="34" charset="-120"/>
                 <a:ea typeface="微軟正黑體" pitchFamily="34" charset="-120"/>
@@ -3237,7 +3237,7 @@
             <a:r>
               <a:rPr lang="en-US" altLang="zh-CN" b="1" dirty="0">
                 <a:solidFill>
-                  <a:srgbClr val="002060"/>
+                  <a:srgbClr val="000066"/>
                 </a:solidFill>
                 <a:latin typeface="微軟正黑體" pitchFamily="34" charset="-120"/>
                 <a:ea typeface="微軟正黑體" pitchFamily="34" charset="-120"/>
@@ -3247,7 +3247,7 @@
             <a:r>
               <a:rPr lang="zh-CN" altLang="en-US" b="1" dirty="0">
                 <a:solidFill>
-                  <a:srgbClr val="002060"/>
+                  <a:srgbClr val="000066"/>
                 </a:solidFill>
                 <a:latin typeface="微軟正黑體" pitchFamily="34" charset="-120"/>
                 <a:ea typeface="微軟正黑體" pitchFamily="34" charset="-120"/>
@@ -3257,7 +3257,7 @@
             <a:r>
               <a:rPr lang="en-US" altLang="zh-CN" b="1" dirty="0">
                 <a:solidFill>
-                  <a:srgbClr val="002060"/>
+                  <a:srgbClr val="000066"/>
                 </a:solidFill>
                 <a:latin typeface="微軟正黑體" pitchFamily="34" charset="-120"/>
                 <a:ea typeface="微軟正黑體" pitchFamily="34" charset="-120"/>
@@ -3267,7 +3267,7 @@
             <a:r>
               <a:rPr lang="zh-CN" altLang="en-US" b="1" dirty="0">
                 <a:solidFill>
-                  <a:srgbClr val="002060"/>
+                  <a:srgbClr val="000066"/>
                 </a:solidFill>
                 <a:latin typeface="微軟正黑體" pitchFamily="34" charset="-120"/>
                 <a:ea typeface="微軟正黑體" pitchFamily="34" charset="-120"/>
@@ -3277,7 +3277,7 @@
             <a:r>
               <a:rPr lang="en-US" altLang="zh-CN" b="1" dirty="0">
                 <a:solidFill>
-                  <a:srgbClr val="002060"/>
+                  <a:srgbClr val="000066"/>
                 </a:solidFill>
                 <a:latin typeface="微軟正黑體" pitchFamily="34" charset="-120"/>
                 <a:ea typeface="微軟正黑體" pitchFamily="34" charset="-120"/>
@@ -3287,7 +3287,7 @@
             <a:r>
               <a:rPr lang="zh-CN" altLang="en-US" b="1" dirty="0">
                 <a:solidFill>
-                  <a:srgbClr val="002060"/>
+                  <a:srgbClr val="000066"/>
                 </a:solidFill>
                 <a:latin typeface="微軟正黑體" pitchFamily="34" charset="-120"/>
                 <a:ea typeface="微軟正黑體" pitchFamily="34" charset="-120"/>
@@ -3297,7 +3297,7 @@
             <a:r>
               <a:rPr lang="en-US" altLang="zh-CN" b="1" dirty="0">
                 <a:solidFill>
-                  <a:srgbClr val="002060"/>
+                  <a:srgbClr val="000066"/>
                 </a:solidFill>
                 <a:latin typeface="微軟正黑體" pitchFamily="34" charset="-120"/>
                 <a:ea typeface="微軟正黑體" pitchFamily="34" charset="-120"/>
@@ -3307,7 +3307,7 @@
             <a:r>
               <a:rPr lang="zh-CN" altLang="en-US" b="1" dirty="0">
                 <a:solidFill>
-                  <a:srgbClr val="002060"/>
+                  <a:srgbClr val="000066"/>
                 </a:solidFill>
                 <a:latin typeface="微軟正黑體" pitchFamily="34" charset="-120"/>
                 <a:ea typeface="微軟正黑體" pitchFamily="34" charset="-120"/>
@@ -3317,7 +3317,7 @@
             <a:r>
               <a:rPr lang="en-US" altLang="zh-CN" b="1" dirty="0">
                 <a:solidFill>
-                  <a:srgbClr val="002060"/>
+                  <a:srgbClr val="000066"/>
                 </a:solidFill>
                 <a:latin typeface="微軟正黑體" pitchFamily="34" charset="-120"/>
                 <a:ea typeface="微軟正黑體" pitchFamily="34" charset="-120"/>
@@ -3327,7 +3327,7 @@
             <a:r>
               <a:rPr lang="zh-CN" altLang="en-US" b="1" dirty="0">
                 <a:solidFill>
-                  <a:srgbClr val="002060"/>
+                  <a:srgbClr val="000066"/>
                 </a:solidFill>
                 <a:latin typeface="微軟正黑體" pitchFamily="34" charset="-120"/>
                 <a:ea typeface="微軟正黑體" pitchFamily="34" charset="-120"/>
@@ -3337,7 +3337,7 @@
             <a:r>
               <a:rPr lang="en-US" altLang="zh-CN" b="1" dirty="0">
                 <a:solidFill>
-                  <a:srgbClr val="002060"/>
+                  <a:srgbClr val="000066"/>
                 </a:solidFill>
                 <a:latin typeface="微軟正黑體" pitchFamily="34" charset="-120"/>
                 <a:ea typeface="微軟正黑體" pitchFamily="34" charset="-120"/>
@@ -3347,7 +3347,7 @@
             <a:r>
               <a:rPr lang="zh-CN" altLang="en-US" b="1" dirty="0">
                 <a:solidFill>
-                  <a:srgbClr val="002060"/>
+                  <a:srgbClr val="000066"/>
                 </a:solidFill>
                 <a:latin typeface="微軟正黑體" pitchFamily="34" charset="-120"/>
                 <a:ea typeface="微軟正黑體" pitchFamily="34" charset="-120"/>
@@ -3356,7 +3356,7 @@
             </a:r>
             <a:endParaRPr lang="en-US" altLang="zh-CN" b="1" dirty="0">
               <a:solidFill>
-                <a:srgbClr val="002060"/>
+                <a:srgbClr val="000066"/>
               </a:solidFill>
               <a:latin typeface="微軟正黑體" pitchFamily="34" charset="-120"/>
               <a:ea typeface="微軟正黑體" pitchFamily="34" charset="-120"/>
@@ -3366,7 +3366,7 @@
             <a:r>
               <a:rPr lang="zh-CN" altLang="en-US" b="1" dirty="0">
                 <a:solidFill>
-                  <a:srgbClr val="002060"/>
+                  <a:srgbClr val="000066"/>
                 </a:solidFill>
                 <a:latin typeface="微軟正黑體" pitchFamily="34" charset="-120"/>
                 <a:ea typeface="微軟正黑體" pitchFamily="34" charset="-120"/>
@@ -3376,7 +3376,7 @@
             <a:r>
               <a:rPr lang="en-US" altLang="zh-CN" b="1" dirty="0">
                 <a:solidFill>
-                  <a:srgbClr val="002060"/>
+                  <a:srgbClr val="000066"/>
                 </a:solidFill>
                 <a:latin typeface="微軟正黑體" pitchFamily="34" charset="-120"/>
                 <a:ea typeface="微軟正黑體" pitchFamily="34" charset="-120"/>
@@ -3386,7 +3386,7 @@
             <a:r>
               <a:rPr lang="zh-CN" altLang="en-US" b="1" dirty="0">
                 <a:solidFill>
-                  <a:srgbClr val="002060"/>
+                  <a:srgbClr val="000066"/>
                 </a:solidFill>
                 <a:latin typeface="微軟正黑體" pitchFamily="34" charset="-120"/>
                 <a:ea typeface="微軟正黑體" pitchFamily="34" charset="-120"/>
@@ -3396,7 +3396,7 @@
             <a:r>
               <a:rPr lang="en-US" altLang="zh-CN" b="1" dirty="0">
                 <a:solidFill>
-                  <a:srgbClr val="002060"/>
+                  <a:srgbClr val="000066"/>
                 </a:solidFill>
                 <a:latin typeface="微軟正黑體" pitchFamily="34" charset="-120"/>
                 <a:ea typeface="微軟正黑體" pitchFamily="34" charset="-120"/>
@@ -3406,7 +3406,7 @@
             <a:r>
               <a:rPr lang="zh-CN" altLang="en-US" b="1" dirty="0">
                 <a:solidFill>
-                  <a:srgbClr val="002060"/>
+                  <a:srgbClr val="000066"/>
                 </a:solidFill>
                 <a:latin typeface="微軟正黑體" pitchFamily="34" charset="-120"/>
                 <a:ea typeface="微軟正黑體" pitchFamily="34" charset="-120"/>
@@ -3416,7 +3416,7 @@
             <a:r>
               <a:rPr lang="en-US" altLang="zh-CN" b="1" dirty="0">
                 <a:solidFill>
-                  <a:srgbClr val="002060"/>
+                  <a:srgbClr val="000066"/>
                 </a:solidFill>
                 <a:latin typeface="微軟正黑體" pitchFamily="34" charset="-120"/>
                 <a:ea typeface="微軟正黑體" pitchFamily="34" charset="-120"/>
@@ -3426,7 +3426,7 @@
             <a:r>
               <a:rPr lang="zh-CN" altLang="en-US" b="1" dirty="0">
                 <a:solidFill>
-                  <a:srgbClr val="002060"/>
+                  <a:srgbClr val="000066"/>
                 </a:solidFill>
                 <a:latin typeface="微軟正黑體" pitchFamily="34" charset="-120"/>
                 <a:ea typeface="微軟正黑體" pitchFamily="34" charset="-120"/>
@@ -3436,7 +3436,7 @@
             <a:r>
               <a:rPr lang="en-US" altLang="zh-CN" b="1" dirty="0">
                 <a:solidFill>
-                  <a:srgbClr val="002060"/>
+                  <a:srgbClr val="000066"/>
                 </a:solidFill>
                 <a:latin typeface="微軟正黑體" pitchFamily="34" charset="-120"/>
                 <a:ea typeface="微軟正黑體" pitchFamily="34" charset="-120"/>
@@ -3445,7 +3445,7 @@
             </a:r>
             <a:endParaRPr lang="en-US" b="1" dirty="0">
               <a:solidFill>
-                <a:srgbClr val="002060"/>
+                <a:srgbClr val="000066"/>
               </a:solidFill>
               <a:latin typeface="微軟正黑體" pitchFamily="34" charset="-120"/>
               <a:ea typeface="微軟正黑體" pitchFamily="34" charset="-120"/>
@@ -3503,7 +3503,7 @@
             <a:r>
               <a:rPr lang="zh-TW" altLang="en-US" sz="6400" dirty="0">
                 <a:solidFill>
-                  <a:srgbClr val="002060"/>
+                  <a:srgbClr val="000066"/>
                 </a:solidFill>
                 <a:latin typeface="微軟正黑體" pitchFamily="34" charset="-120"/>
                 <a:ea typeface="微軟正黑體" pitchFamily="34" charset="-120"/>
@@ -3512,7 +3512,7 @@
             </a:r>
             <a:endParaRPr lang="en-US" altLang="zh-TW" sz="6400" dirty="0">
               <a:solidFill>
-                <a:srgbClr val="002060"/>
+                <a:srgbClr val="000066"/>
               </a:solidFill>
               <a:latin typeface="微軟正黑體" pitchFamily="34" charset="-120"/>
               <a:ea typeface="微軟正黑體" pitchFamily="34" charset="-120"/>
@@ -3582,7 +3582,7 @@
             <a:r>
               <a:rPr lang="zh-TW" altLang="en-US" sz="6400" b="1" dirty="0">
                 <a:solidFill>
-                  <a:srgbClr val="002060"/>
+                  <a:srgbClr val="000066"/>
                 </a:solidFill>
                 <a:latin typeface="Microsoft JhengHei" pitchFamily="34" charset="-120"/>
                 <a:ea typeface="Microsoft JhengHei" pitchFamily="34" charset="-120"/>
@@ -3592,7 +3592,7 @@
             <a:r>
               <a:rPr lang="en-US" altLang="zh-TW" sz="6400" b="1" dirty="0">
                 <a:solidFill>
-                  <a:srgbClr val="002060"/>
+                  <a:srgbClr val="000066"/>
                 </a:solidFill>
                 <a:latin typeface="Microsoft JhengHei" pitchFamily="34" charset="-120"/>
                 <a:ea typeface="Microsoft JhengHei" pitchFamily="34" charset="-120"/>
@@ -3664,7 +3664,7 @@
             <a:r>
               <a:rPr lang="zh-TW" altLang="en-US" sz="6400" dirty="0">
                 <a:solidFill>
-                  <a:srgbClr val="002060"/>
+                  <a:srgbClr val="000066"/>
                 </a:solidFill>
                 <a:latin typeface="微軟正黑體" pitchFamily="34" charset="-120"/>
                 <a:ea typeface="微軟正黑體" pitchFamily="34" charset="-120"/>
@@ -3673,7 +3673,7 @@
             </a:r>
             <a:endParaRPr lang="en-US" altLang="zh-TW" sz="6400" dirty="0">
               <a:solidFill>
-                <a:srgbClr val="002060"/>
+                <a:srgbClr val="000066"/>
               </a:solidFill>
               <a:latin typeface="微軟正黑體" pitchFamily="34" charset="-120"/>
               <a:ea typeface="微軟正黑體" pitchFamily="34" charset="-120"/>
@@ -3743,7 +3743,7 @@
             <a:r>
               <a:rPr lang="zh-TW" altLang="en-US" sz="6400" b="1" dirty="0">
                 <a:solidFill>
-                  <a:srgbClr val="002060"/>
+                  <a:srgbClr val="000066"/>
                 </a:solidFill>
                 <a:latin typeface="Microsoft JhengHei" pitchFamily="34" charset="-120"/>
                 <a:ea typeface="Microsoft JhengHei" pitchFamily="34" charset="-120"/>
@@ -3752,7 +3752,7 @@
             </a:r>
             <a:endParaRPr lang="en-US" altLang="zh-TW" sz="6400" b="1" dirty="0">
               <a:solidFill>
-                <a:srgbClr val="002060"/>
+                <a:srgbClr val="000066"/>
               </a:solidFill>
               <a:latin typeface="Microsoft JhengHei" pitchFamily="34" charset="-120"/>
               <a:ea typeface="Microsoft JhengHei" pitchFamily="34" charset="-120"/>
@@ -3762,7 +3762,7 @@
             <a:r>
               <a:rPr lang="zh-TW" altLang="en-US" sz="6400" dirty="0">
                 <a:solidFill>
-                  <a:srgbClr val="002060"/>
+                  <a:srgbClr val="000066"/>
                 </a:solidFill>
                 <a:latin typeface="微軟正黑體" pitchFamily="34" charset="-120"/>
                 <a:ea typeface="微軟正黑體" pitchFamily="34" charset="-120"/>
@@ -3771,7 +3771,7 @@
             </a:r>
             <a:endParaRPr lang="en-US" altLang="zh-TW" sz="6400" dirty="0">
               <a:solidFill>
-                <a:srgbClr val="002060"/>
+                <a:srgbClr val="000066"/>
               </a:solidFill>
               <a:latin typeface="微軟正黑體" pitchFamily="34" charset="-120"/>
               <a:ea typeface="微軟正黑體" pitchFamily="34" charset="-120"/>
@@ -3841,7 +3841,7 @@
             <a:r>
               <a:rPr lang="zh-TW" altLang="en-US" sz="6400" b="1" dirty="0">
                 <a:solidFill>
-                  <a:srgbClr val="002060"/>
+                  <a:srgbClr val="000066"/>
                 </a:solidFill>
                 <a:latin typeface="Microsoft JhengHei" pitchFamily="34" charset="-120"/>
                 <a:ea typeface="Microsoft JhengHei" pitchFamily="34" charset="-120"/>
@@ -3851,7 +3851,7 @@
             <a:r>
               <a:rPr lang="en-US" altLang="zh-TW" sz="6400" b="1" dirty="0">
                 <a:solidFill>
-                  <a:srgbClr val="002060"/>
+                  <a:srgbClr val="000066"/>
                 </a:solidFill>
                 <a:latin typeface="Microsoft JhengHei" pitchFamily="34" charset="-120"/>
                 <a:ea typeface="Microsoft JhengHei" pitchFamily="34" charset="-120"/>
@@ -3923,7 +3923,7 @@
             <a:r>
               <a:rPr lang="zh-TW" altLang="en-US" sz="6400" dirty="0">
                 <a:solidFill>
-                  <a:srgbClr val="002060"/>
+                  <a:srgbClr val="000066"/>
                 </a:solidFill>
                 <a:latin typeface="微軟正黑體" pitchFamily="34" charset="-120"/>
                 <a:ea typeface="微軟正黑體" pitchFamily="34" charset="-120"/>
@@ -3933,7 +3933,7 @@
             <a:r>
               <a:rPr lang="en-US" altLang="zh-TW" sz="6400" dirty="0">
                 <a:solidFill>
-                  <a:srgbClr val="002060"/>
+                  <a:srgbClr val="000066"/>
                 </a:solidFill>
                 <a:latin typeface="微軟正黑體" pitchFamily="34" charset="-120"/>
                 <a:ea typeface="微軟正黑體" pitchFamily="34" charset="-120"/>
@@ -4005,7 +4005,7 @@
             <a:r>
               <a:rPr lang="zh-TW" altLang="en-US" sz="6400" b="1" dirty="0">
                 <a:solidFill>
-                  <a:srgbClr val="002060"/>
+                  <a:srgbClr val="000066"/>
                 </a:solidFill>
                 <a:latin typeface="Microsoft JhengHei" pitchFamily="34" charset="-120"/>
                 <a:ea typeface="Microsoft JhengHei" pitchFamily="34" charset="-120"/>
@@ -4015,7 +4015,7 @@
             <a:r>
               <a:rPr lang="en-US" altLang="zh-TW" sz="6400" b="1" dirty="0">
                 <a:solidFill>
-                  <a:srgbClr val="002060"/>
+                  <a:srgbClr val="000066"/>
                 </a:solidFill>
                 <a:latin typeface="Microsoft JhengHei" pitchFamily="34" charset="-120"/>
                 <a:ea typeface="Microsoft JhengHei" pitchFamily="34" charset="-120"/>

</xml_diff>